<commit_message>
Update demo diagram on slides
</commit_message>
<xml_diff>
--- a/wiremock-slides.pptx
+++ b/wiremock-slides.pptx
@@ -209,7 +209,7 @@
           <a:p>
             <a:fld id="{FDC7A044-80D6-46C2-930D-F7E9591ABEB9}" type="datetimeFigureOut">
               <a:rPr lang="en-GB" smtClean="0"/>
-              <a:t>18/10/2016</a:t>
+              <a:t>19/10/2016</a:t>
             </a:fld>
             <a:endParaRPr lang="en-GB"/>
           </a:p>
@@ -2528,7 +2528,7 @@
           <a:p>
             <a:fld id="{86FCE54F-0372-4E4E-B527-70D6A14B2608}" type="datetimeFigureOut">
               <a:rPr lang="en-GB" smtClean="0"/>
-              <a:t>18/10/2016</a:t>
+              <a:t>19/10/2016</a:t>
             </a:fld>
             <a:endParaRPr lang="en-GB"/>
           </a:p>
@@ -2698,7 +2698,7 @@
           <a:p>
             <a:fld id="{86FCE54F-0372-4E4E-B527-70D6A14B2608}" type="datetimeFigureOut">
               <a:rPr lang="en-GB" smtClean="0"/>
-              <a:t>18/10/2016</a:t>
+              <a:t>19/10/2016</a:t>
             </a:fld>
             <a:endParaRPr lang="en-GB"/>
           </a:p>
@@ -2921,7 +2921,7 @@
           <a:p>
             <a:fld id="{86FCE54F-0372-4E4E-B527-70D6A14B2608}" type="datetimeFigureOut">
               <a:rPr lang="en-GB" smtClean="0"/>
-              <a:t>18/10/2016</a:t>
+              <a:t>19/10/2016</a:t>
             </a:fld>
             <a:endParaRPr lang="en-GB"/>
           </a:p>
@@ -3101,7 +3101,7 @@
           <a:p>
             <a:fld id="{86FCE54F-0372-4E4E-B527-70D6A14B2608}" type="datetimeFigureOut">
               <a:rPr lang="en-GB" smtClean="0"/>
-              <a:t>18/10/2016</a:t>
+              <a:t>19/10/2016</a:t>
             </a:fld>
             <a:endParaRPr lang="en-GB"/>
           </a:p>
@@ -3407,7 +3407,7 @@
           <a:p>
             <a:fld id="{86FCE54F-0372-4E4E-B527-70D6A14B2608}" type="datetimeFigureOut">
               <a:rPr lang="en-GB" smtClean="0"/>
-              <a:t>18/10/2016</a:t>
+              <a:t>19/10/2016</a:t>
             </a:fld>
             <a:endParaRPr lang="en-GB"/>
           </a:p>
@@ -3711,7 +3711,7 @@
           <a:p>
             <a:fld id="{86FCE54F-0372-4E4E-B527-70D6A14B2608}" type="datetimeFigureOut">
               <a:rPr lang="en-GB" smtClean="0"/>
-              <a:t>18/10/2016</a:t>
+              <a:t>19/10/2016</a:t>
             </a:fld>
             <a:endParaRPr lang="en-GB"/>
           </a:p>
@@ -4133,7 +4133,7 @@
           <a:p>
             <a:fld id="{86FCE54F-0372-4E4E-B527-70D6A14B2608}" type="datetimeFigureOut">
               <a:rPr lang="en-GB" smtClean="0"/>
-              <a:t>18/10/2016</a:t>
+              <a:t>19/10/2016</a:t>
             </a:fld>
             <a:endParaRPr lang="en-GB"/>
           </a:p>
@@ -4251,7 +4251,7 @@
           <a:p>
             <a:fld id="{86FCE54F-0372-4E4E-B527-70D6A14B2608}" type="datetimeFigureOut">
               <a:rPr lang="en-GB" smtClean="0"/>
-              <a:t>18/10/2016</a:t>
+              <a:t>19/10/2016</a:t>
             </a:fld>
             <a:endParaRPr lang="en-GB"/>
           </a:p>
@@ -4346,7 +4346,7 @@
           <a:p>
             <a:fld id="{86FCE54F-0372-4E4E-B527-70D6A14B2608}" type="datetimeFigureOut">
               <a:rPr lang="en-GB" smtClean="0"/>
-              <a:t>18/10/2016</a:t>
+              <a:t>19/10/2016</a:t>
             </a:fld>
             <a:endParaRPr lang="en-GB"/>
           </a:p>
@@ -4619,7 +4619,7 @@
           <a:p>
             <a:fld id="{86FCE54F-0372-4E4E-B527-70D6A14B2608}" type="datetimeFigureOut">
               <a:rPr lang="en-GB" smtClean="0"/>
-              <a:t>18/10/2016</a:t>
+              <a:t>19/10/2016</a:t>
             </a:fld>
             <a:endParaRPr lang="en-GB"/>
           </a:p>
@@ -4884,7 +4884,7 @@
           <a:p>
             <a:fld id="{86FCE54F-0372-4E4E-B527-70D6A14B2608}" type="datetimeFigureOut">
               <a:rPr lang="en-GB" smtClean="0"/>
-              <a:t>18/10/2016</a:t>
+              <a:t>19/10/2016</a:t>
             </a:fld>
             <a:endParaRPr lang="en-GB"/>
           </a:p>
@@ -5133,7 +5133,7 @@
           <a:p>
             <a:fld id="{86FCE54F-0372-4E4E-B527-70D6A14B2608}" type="datetimeFigureOut">
               <a:rPr lang="en-GB" smtClean="0"/>
-              <a:t>18/10/2016</a:t>
+              <a:t>19/10/2016</a:t>
             </a:fld>
             <a:endParaRPr lang="en-GB"/>
           </a:p>
@@ -5928,7 +5928,7 @@
                               <p:par>
                                 <p:cTn id="5" presetID="10" presetClass="entr" presetSubtype="0" fill="hold" grpId="0" nodeType="afterEffect">
                                   <p:stCondLst>
-                                    <p:cond delay="500"/>
+                                    <p:cond delay="250"/>
                                   </p:stCondLst>
                                   <p:childTnLst>
                                     <p:set>
@@ -5974,13 +5974,13 @@
                         <p:par>
                           <p:cTn id="8" fill="hold">
                             <p:stCondLst>
-                              <p:cond delay="1000"/>
+                              <p:cond delay="750"/>
                             </p:stCondLst>
                             <p:childTnLst>
                               <p:par>
                                 <p:cTn id="9" presetID="10" presetClass="entr" presetSubtype="0" fill="hold" grpId="0" nodeType="afterEffect">
                                   <p:stCondLst>
-                                    <p:cond delay="500"/>
+                                    <p:cond delay="250"/>
                                   </p:stCondLst>
                                   <p:childTnLst>
                                     <p:set>
@@ -6026,13 +6026,13 @@
                         <p:par>
                           <p:cTn id="12" fill="hold">
                             <p:stCondLst>
-                              <p:cond delay="2000"/>
+                              <p:cond delay="1500"/>
                             </p:stCondLst>
                             <p:childTnLst>
                               <p:par>
                                 <p:cTn id="13" presetID="10" presetClass="entr" presetSubtype="0" fill="hold" grpId="0" nodeType="afterEffect">
                                   <p:stCondLst>
-                                    <p:cond delay="500"/>
+                                    <p:cond delay="250"/>
                                   </p:stCondLst>
                                   <p:childTnLst>
                                     <p:set>
@@ -6078,13 +6078,13 @@
                         <p:par>
                           <p:cTn id="16" fill="hold">
                             <p:stCondLst>
-                              <p:cond delay="3000"/>
+                              <p:cond delay="2250"/>
                             </p:stCondLst>
                             <p:childTnLst>
                               <p:par>
                                 <p:cTn id="17" presetID="10" presetClass="entr" presetSubtype="0" fill="hold" grpId="0" nodeType="afterEffect">
                                   <p:stCondLst>
-                                    <p:cond delay="500"/>
+                                    <p:cond delay="250"/>
                                   </p:stCondLst>
                                   <p:childTnLst>
                                     <p:set>
@@ -6130,13 +6130,13 @@
                         <p:par>
                           <p:cTn id="20" fill="hold">
                             <p:stCondLst>
-                              <p:cond delay="4000"/>
+                              <p:cond delay="3000"/>
                             </p:stCondLst>
                             <p:childTnLst>
                               <p:par>
                                 <p:cTn id="21" presetID="10" presetClass="entr" presetSubtype="0" fill="hold" grpId="0" nodeType="afterEffect">
                                   <p:stCondLst>
-                                    <p:cond delay="500"/>
+                                    <p:cond delay="250"/>
                                   </p:stCondLst>
                                   <p:childTnLst>
                                     <p:set>
@@ -6182,13 +6182,13 @@
                         <p:par>
                           <p:cTn id="24" fill="hold">
                             <p:stCondLst>
-                              <p:cond delay="5000"/>
+                              <p:cond delay="3750"/>
                             </p:stCondLst>
                             <p:childTnLst>
                               <p:par>
                                 <p:cTn id="25" presetID="10" presetClass="entr" presetSubtype="0" fill="hold" grpId="0" nodeType="afterEffect">
                                   <p:stCondLst>
-                                    <p:cond delay="500"/>
+                                    <p:cond delay="250"/>
                                   </p:stCondLst>
                                   <p:childTnLst>
                                     <p:set>
@@ -6349,7 +6349,7 @@
       </p:pic>
       <p:pic>
         <p:nvPicPr>
-          <p:cNvPr id="5122" name="Picture 2" descr="ما مالهم u )A &#10;جع ) e &#10;٣rPب GC &#10;بهمعد &#10;«د 46* &#10;٣٥٤٥ "/>
+          <p:cNvPr id="1026" name="Picture 2" descr="٤٤٣ &#10;.8 &#10;٣ &#10;دها ٩sا &#10;ssoR€ecoc &#10;٦٦٣ 66T &#10;ها se٤ىى &#10;٣٩٥٧١o»e "/>
           <p:cNvPicPr>
             <a:picLocks noChangeAspect="1" noChangeArrowheads="1"/>
           </p:cNvPicPr>
@@ -6370,8 +6370,8 @@
         </p:blipFill>
         <p:spPr bwMode="auto">
           <a:xfrm>
-            <a:off x="3498444" y="2601172"/>
-            <a:ext cx="5182821" cy="3164634"/>
+            <a:off x="3498444" y="2488630"/>
+            <a:ext cx="4836664" cy="3648400"/>
           </a:xfrm>
           <a:prstGeom prst="rect">
             <a:avLst/>
@@ -6405,6 +6405,92 @@
   <p:clrMapOvr>
     <a:masterClrMapping/>
   </p:clrMapOvr>
+  <p:timing>
+    <p:tnLst>
+      <p:par>
+        <p:cTn id="1" dur="indefinite" restart="never" nodeType="tmRoot">
+          <p:childTnLst>
+            <p:seq concurrent="1" nextAc="seek">
+              <p:cTn id="2" dur="indefinite" nodeType="mainSeq">
+                <p:childTnLst>
+                  <p:par>
+                    <p:cTn id="3" fill="hold">
+                      <p:stCondLst>
+                        <p:cond delay="indefinite"/>
+                        <p:cond evt="onBegin" delay="0">
+                          <p:tn val="2"/>
+                        </p:cond>
+                      </p:stCondLst>
+                      <p:childTnLst>
+                        <p:par>
+                          <p:cTn id="4" fill="hold">
+                            <p:stCondLst>
+                              <p:cond delay="0"/>
+                            </p:stCondLst>
+                            <p:childTnLst>
+                              <p:par>
+                                <p:cTn id="5" presetID="10" presetClass="entr" presetSubtype="0" fill="hold" nodeType="afterEffect">
+                                  <p:stCondLst>
+                                    <p:cond delay="250"/>
+                                  </p:stCondLst>
+                                  <p:childTnLst>
+                                    <p:set>
+                                      <p:cBhvr>
+                                        <p:cTn id="6" dur="1" fill="hold">
+                                          <p:stCondLst>
+                                            <p:cond delay="0"/>
+                                          </p:stCondLst>
+                                        </p:cTn>
+                                        <p:tgtEl>
+                                          <p:spTgt spid="1026"/>
+                                        </p:tgtEl>
+                                        <p:attrNameLst>
+                                          <p:attrName>style.visibility</p:attrName>
+                                        </p:attrNameLst>
+                                      </p:cBhvr>
+                                      <p:to>
+                                        <p:strVal val="visible"/>
+                                      </p:to>
+                                    </p:set>
+                                    <p:animEffect transition="in" filter="fade">
+                                      <p:cBhvr>
+                                        <p:cTn id="7" dur="500"/>
+                                        <p:tgtEl>
+                                          <p:spTgt spid="1026"/>
+                                        </p:tgtEl>
+                                      </p:cBhvr>
+                                    </p:animEffect>
+                                  </p:childTnLst>
+                                </p:cTn>
+                              </p:par>
+                            </p:childTnLst>
+                          </p:cTn>
+                        </p:par>
+                      </p:childTnLst>
+                    </p:cTn>
+                  </p:par>
+                </p:childTnLst>
+              </p:cTn>
+              <p:prevCondLst>
+                <p:cond evt="onPrev" delay="0">
+                  <p:tgtEl>
+                    <p:sldTgt/>
+                  </p:tgtEl>
+                </p:cond>
+              </p:prevCondLst>
+              <p:nextCondLst>
+                <p:cond evt="onNext" delay="0">
+                  <p:tgtEl>
+                    <p:sldTgt/>
+                  </p:tgtEl>
+                </p:cond>
+              </p:nextCondLst>
+            </p:seq>
+          </p:childTnLst>
+        </p:cTn>
+      </p:par>
+    </p:tnLst>
+  </p:timing>
 </p:sld>
 </file>
 
@@ -6604,7 +6690,7 @@
                               <p:par>
                                 <p:cTn id="5" presetID="10" presetClass="entr" presetSubtype="0" fill="hold" nodeType="afterEffect">
                                   <p:stCondLst>
-                                    <p:cond delay="500"/>
+                                    <p:cond delay="250"/>
                                   </p:stCondLst>
                                   <p:childTnLst>
                                     <p:set>
@@ -6650,13 +6736,13 @@
                         <p:par>
                           <p:cTn id="8" fill="hold">
                             <p:stCondLst>
-                              <p:cond delay="1000"/>
+                              <p:cond delay="750"/>
                             </p:stCondLst>
                             <p:childTnLst>
                               <p:par>
                                 <p:cTn id="9" presetID="10" presetClass="entr" presetSubtype="0" fill="hold" nodeType="afterEffect">
                                   <p:stCondLst>
-                                    <p:cond delay="500"/>
+                                    <p:cond delay="250"/>
                                   </p:stCondLst>
                                   <p:childTnLst>
                                     <p:set>
@@ -6702,13 +6788,13 @@
                         <p:par>
                           <p:cTn id="12" fill="hold">
                             <p:stCondLst>
-                              <p:cond delay="2000"/>
+                              <p:cond delay="1500"/>
                             </p:stCondLst>
                             <p:childTnLst>
                               <p:par>
                                 <p:cTn id="13" presetID="10" presetClass="entr" presetSubtype="0" fill="hold" nodeType="afterEffect">
                                   <p:stCondLst>
-                                    <p:cond delay="500"/>
+                                    <p:cond delay="250"/>
                                   </p:stCondLst>
                                   <p:childTnLst>
                                     <p:set>
@@ -6754,13 +6840,13 @@
                         <p:par>
                           <p:cTn id="16" fill="hold">
                             <p:stCondLst>
-                              <p:cond delay="3000"/>
+                              <p:cond delay="2250"/>
                             </p:stCondLst>
                             <p:childTnLst>
                               <p:par>
                                 <p:cTn id="17" presetID="10" presetClass="entr" presetSubtype="0" fill="hold" nodeType="afterEffect">
                                   <p:stCondLst>
-                                    <p:cond delay="500"/>
+                                    <p:cond delay="250"/>
                                   </p:stCondLst>
                                   <p:childTnLst>
                                     <p:set>
@@ -6998,7 +7084,7 @@
                               <p:par>
                                 <p:cTn id="5" presetID="10" presetClass="entr" presetSubtype="0" fill="hold" grpId="0" nodeType="afterEffect">
                                   <p:stCondLst>
-                                    <p:cond delay="500"/>
+                                    <p:cond delay="250"/>
                                   </p:stCondLst>
                                   <p:childTnLst>
                                     <p:set>
@@ -7169,7 +7255,7 @@
             </a:pPr>
             <a:r>
               <a:rPr lang="en-GB" sz="4400" b="1" dirty="0"/>
-              <a:t>Automated Tests…?</a:t>
+              <a:t>Automated tests…?</a:t>
             </a:r>
           </a:p>
         </p:txBody>
@@ -7210,7 +7296,7 @@
                               <p:par>
                                 <p:cTn id="5" presetID="10" presetClass="entr" presetSubtype="0" fill="hold" grpId="0" nodeType="afterEffect">
                                   <p:stCondLst>
-                                    <p:cond delay="500"/>
+                                    <p:cond delay="250"/>
                                   </p:stCondLst>
                                   <p:childTnLst>
                                     <p:set>
@@ -7256,13 +7342,13 @@
                         <p:par>
                           <p:cTn id="8" fill="hold">
                             <p:stCondLst>
-                              <p:cond delay="1000"/>
+                              <p:cond delay="750"/>
                             </p:stCondLst>
                             <p:childTnLst>
                               <p:par>
                                 <p:cTn id="9" presetID="10" presetClass="entr" presetSubtype="0" fill="hold" grpId="0" nodeType="afterEffect">
                                   <p:stCondLst>
-                                    <p:cond delay="500"/>
+                                    <p:cond delay="250"/>
                                   </p:stCondLst>
                                   <p:childTnLst>
                                     <p:set>
@@ -7308,13 +7394,13 @@
                         <p:par>
                           <p:cTn id="12" fill="hold">
                             <p:stCondLst>
-                              <p:cond delay="2000"/>
+                              <p:cond delay="1500"/>
                             </p:stCondLst>
                             <p:childTnLst>
                               <p:par>
                                 <p:cTn id="13" presetID="10" presetClass="entr" presetSubtype="0" fill="hold" grpId="0" nodeType="afterEffect">
                                   <p:stCondLst>
-                                    <p:cond delay="500"/>
+                                    <p:cond delay="250"/>
                                   </p:stCondLst>
                                   <p:childTnLst>
                                     <p:set>
@@ -7360,13 +7446,13 @@
                         <p:par>
                           <p:cTn id="16" fill="hold">
                             <p:stCondLst>
-                              <p:cond delay="3000"/>
+                              <p:cond delay="2250"/>
                             </p:stCondLst>
                             <p:childTnLst>
                               <p:par>
                                 <p:cTn id="17" presetID="10" presetClass="entr" presetSubtype="0" fill="hold" grpId="0" nodeType="afterEffect">
                                   <p:stCondLst>
-                                    <p:cond delay="500"/>
+                                    <p:cond delay="250"/>
                                   </p:stCondLst>
                                   <p:childTnLst>
                                     <p:set>

</xml_diff>